<commit_message>
Update comment in MemoryMap on paging area, also update picture showing this
</commit_message>
<xml_diff>
--- a/doc/images/memory-map.pptx
+++ b/doc/images/memory-map.pptx
@@ -289,7 +289,7 @@
             <a:fld id="{5F72E65A-802C-4B45-8D51-61CF7EE1CB32}" type="datetimeFigureOut">
               <a:rPr lang="en-US" smtClean="0"/>
               <a:pPr/>
-              <a:t>1/30/2024</a:t>
+              <a:t>8/29/2024</a:t>
             </a:fld>
             <a:endParaRPr lang="en-US"/>
           </a:p>
@@ -456,7 +456,7 @@
             <a:fld id="{5F72E65A-802C-4B45-8D51-61CF7EE1CB32}" type="datetimeFigureOut">
               <a:rPr lang="en-US" smtClean="0"/>
               <a:pPr/>
-              <a:t>1/30/2024</a:t>
+              <a:t>8/29/2024</a:t>
             </a:fld>
             <a:endParaRPr lang="en-US"/>
           </a:p>
@@ -633,7 +633,7 @@
             <a:fld id="{5F72E65A-802C-4B45-8D51-61CF7EE1CB32}" type="datetimeFigureOut">
               <a:rPr lang="en-US" smtClean="0"/>
               <a:pPr/>
-              <a:t>1/30/2024</a:t>
+              <a:t>8/29/2024</a:t>
             </a:fld>
             <a:endParaRPr lang="en-US"/>
           </a:p>
@@ -800,7 +800,7 @@
             <a:fld id="{5F72E65A-802C-4B45-8D51-61CF7EE1CB32}" type="datetimeFigureOut">
               <a:rPr lang="en-US" smtClean="0"/>
               <a:pPr/>
-              <a:t>1/30/2024</a:t>
+              <a:t>8/29/2024</a:t>
             </a:fld>
             <a:endParaRPr lang="en-US"/>
           </a:p>
@@ -1043,7 +1043,7 @@
             <a:fld id="{5F72E65A-802C-4B45-8D51-61CF7EE1CB32}" type="datetimeFigureOut">
               <a:rPr lang="en-US" smtClean="0"/>
               <a:pPr/>
-              <a:t>1/30/2024</a:t>
+              <a:t>8/29/2024</a:t>
             </a:fld>
             <a:endParaRPr lang="en-US"/>
           </a:p>
@@ -1328,7 +1328,7 @@
             <a:fld id="{5F72E65A-802C-4B45-8D51-61CF7EE1CB32}" type="datetimeFigureOut">
               <a:rPr lang="en-US" smtClean="0"/>
               <a:pPr/>
-              <a:t>1/30/2024</a:t>
+              <a:t>8/29/2024</a:t>
             </a:fld>
             <a:endParaRPr lang="en-US"/>
           </a:p>
@@ -1752,7 +1752,7 @@
             <a:fld id="{5F72E65A-802C-4B45-8D51-61CF7EE1CB32}" type="datetimeFigureOut">
               <a:rPr lang="en-US" smtClean="0"/>
               <a:pPr/>
-              <a:t>1/30/2024</a:t>
+              <a:t>8/29/2024</a:t>
             </a:fld>
             <a:endParaRPr lang="en-US"/>
           </a:p>
@@ -1867,7 +1867,7 @@
             <a:fld id="{5F72E65A-802C-4B45-8D51-61CF7EE1CB32}" type="datetimeFigureOut">
               <a:rPr lang="en-US" smtClean="0"/>
               <a:pPr/>
-              <a:t>1/30/2024</a:t>
+              <a:t>8/29/2024</a:t>
             </a:fld>
             <a:endParaRPr lang="en-US"/>
           </a:p>
@@ -1959,7 +1959,7 @@
             <a:fld id="{5F72E65A-802C-4B45-8D51-61CF7EE1CB32}" type="datetimeFigureOut">
               <a:rPr lang="en-US" smtClean="0"/>
               <a:pPr/>
-              <a:t>1/30/2024</a:t>
+              <a:t>8/29/2024</a:t>
             </a:fld>
             <a:endParaRPr lang="en-US"/>
           </a:p>
@@ -2233,7 +2233,7 @@
             <a:fld id="{5F72E65A-802C-4B45-8D51-61CF7EE1CB32}" type="datetimeFigureOut">
               <a:rPr lang="en-US" smtClean="0"/>
               <a:pPr/>
-              <a:t>1/30/2024</a:t>
+              <a:t>8/29/2024</a:t>
             </a:fld>
             <a:endParaRPr lang="en-US"/>
           </a:p>
@@ -2483,7 +2483,7 @@
             <a:fld id="{5F72E65A-802C-4B45-8D51-61CF7EE1CB32}" type="datetimeFigureOut">
               <a:rPr lang="en-US" smtClean="0"/>
               <a:pPr/>
-              <a:t>1/30/2024</a:t>
+              <a:t>8/29/2024</a:t>
             </a:fld>
             <a:endParaRPr lang="en-US"/>
           </a:p>
@@ -2693,7 +2693,7 @@
             <a:fld id="{5F72E65A-802C-4B45-8D51-61CF7EE1CB32}" type="datetimeFigureOut">
               <a:rPr lang="en-US" smtClean="0"/>
               <a:pPr/>
-              <a:t>1/30/2024</a:t>
+              <a:t>8/29/2024</a:t>
             </a:fld>
             <a:endParaRPr lang="en-US"/>
           </a:p>
@@ -3072,8 +3072,8 @@
         </p:nvSpPr>
         <p:spPr>
           <a:xfrm>
-            <a:off x="614323" y="199994"/>
-            <a:ext cx="11572956" cy="9101201"/>
+            <a:off x="614323" y="0"/>
+            <a:ext cx="11572956" cy="9601200"/>
           </a:xfrm>
           <a:prstGeom prst="rect">
             <a:avLst/>
@@ -3128,7 +3128,7 @@
         </p:nvSpPr>
         <p:spPr>
           <a:xfrm>
-            <a:off x="757198" y="300006"/>
+            <a:off x="757198" y="85693"/>
             <a:ext cx="5643601" cy="571504"/>
           </a:xfrm>
           <a:prstGeom prst="rect">
@@ -3184,7 +3184,7 @@
         </p:nvSpPr>
         <p:spPr>
           <a:xfrm>
-            <a:off x="757198" y="871510"/>
+            <a:off x="757198" y="657197"/>
             <a:ext cx="5643601" cy="571504"/>
           </a:xfrm>
           <a:prstGeom prst="rect">
@@ -3240,7 +3240,7 @@
         </p:nvSpPr>
         <p:spPr>
           <a:xfrm>
-            <a:off x="757198" y="1585890"/>
+            <a:off x="757198" y="1371577"/>
             <a:ext cx="5643601" cy="2071701"/>
           </a:xfrm>
           <a:prstGeom prst="rect">
@@ -3295,7 +3295,7 @@
         </p:nvSpPr>
         <p:spPr>
           <a:xfrm>
-            <a:off x="757198" y="3657592"/>
+            <a:off x="757198" y="3443279"/>
             <a:ext cx="5643601" cy="1357322"/>
           </a:xfrm>
           <a:prstGeom prst="rect">
@@ -3351,7 +3351,7 @@
         </p:nvSpPr>
         <p:spPr>
           <a:xfrm>
-            <a:off x="757198" y="5014914"/>
+            <a:off x="757198" y="4800601"/>
             <a:ext cx="5643601" cy="1357322"/>
           </a:xfrm>
           <a:prstGeom prst="rect">
@@ -3407,7 +3407,7 @@
         </p:nvSpPr>
         <p:spPr>
           <a:xfrm>
-            <a:off x="757198" y="6657989"/>
+            <a:off x="757198" y="6443676"/>
             <a:ext cx="5643601" cy="1143008"/>
           </a:xfrm>
           <a:prstGeom prst="rect">
@@ -3462,7 +3462,7 @@
         </p:nvSpPr>
         <p:spPr>
           <a:xfrm>
-            <a:off x="757198" y="7800997"/>
+            <a:off x="757198" y="8158187"/>
             <a:ext cx="5643602" cy="428627"/>
           </a:xfrm>
           <a:prstGeom prst="rect">
@@ -3518,7 +3518,7 @@
         </p:nvSpPr>
         <p:spPr>
           <a:xfrm>
-            <a:off x="900073" y="1943080"/>
+            <a:off x="900073" y="1728767"/>
             <a:ext cx="5429288" cy="1643074"/>
           </a:xfrm>
           <a:prstGeom prst="rect">
@@ -3630,7 +3630,7 @@
         </p:nvSpPr>
         <p:spPr>
           <a:xfrm>
-            <a:off x="900073" y="4014782"/>
+            <a:off x="900073" y="3800469"/>
             <a:ext cx="5429288" cy="928694"/>
           </a:xfrm>
           <a:prstGeom prst="rect">
@@ -3704,7 +3704,7 @@
         </p:nvSpPr>
         <p:spPr>
           <a:xfrm>
-            <a:off x="900073" y="5372104"/>
+            <a:off x="900073" y="5157791"/>
             <a:ext cx="5429288" cy="928694"/>
           </a:xfrm>
           <a:prstGeom prst="rect">
@@ -3778,7 +3778,7 @@
         </p:nvSpPr>
         <p:spPr>
           <a:xfrm>
-            <a:off x="6472237" y="300005"/>
+            <a:off x="6472237" y="85692"/>
             <a:ext cx="500066" cy="571504"/>
           </a:xfrm>
           <a:prstGeom prst="rightBrace">
@@ -3824,7 +3824,7 @@
         </p:nvSpPr>
         <p:spPr>
           <a:xfrm>
-            <a:off x="6472237" y="1657328"/>
+            <a:off x="6472237" y="1443015"/>
             <a:ext cx="500066" cy="1928826"/>
           </a:xfrm>
           <a:prstGeom prst="rightBrace">
@@ -3870,7 +3870,7 @@
         </p:nvSpPr>
         <p:spPr>
           <a:xfrm>
-            <a:off x="7115179" y="300005"/>
+            <a:off x="7115179" y="85692"/>
             <a:ext cx="2428892" cy="571504"/>
           </a:xfrm>
           <a:prstGeom prst="rect">
@@ -3914,7 +3914,7 @@
         </p:nvSpPr>
         <p:spPr>
           <a:xfrm>
-            <a:off x="7043741" y="2014518"/>
+            <a:off x="7043741" y="1800205"/>
             <a:ext cx="2500330" cy="1285884"/>
           </a:xfrm>
           <a:prstGeom prst="rect">
@@ -3968,7 +3968,7 @@
         </p:nvSpPr>
         <p:spPr>
           <a:xfrm>
-            <a:off x="7043741" y="3729030"/>
+            <a:off x="7043741" y="3514717"/>
             <a:ext cx="2500330" cy="1285884"/>
           </a:xfrm>
           <a:prstGeom prst="rect">
@@ -4019,7 +4019,7 @@
         </p:nvSpPr>
         <p:spPr>
           <a:xfrm>
-            <a:off x="6472237" y="3657592"/>
+            <a:off x="6472237" y="3443279"/>
             <a:ext cx="500066" cy="1357322"/>
           </a:xfrm>
           <a:prstGeom prst="rightBrace">
@@ -4065,7 +4065,7 @@
         </p:nvSpPr>
         <p:spPr>
           <a:xfrm>
-            <a:off x="7043741" y="5086352"/>
+            <a:off x="7043741" y="4872039"/>
             <a:ext cx="2500330" cy="1285884"/>
           </a:xfrm>
           <a:prstGeom prst="rect">
@@ -4115,7 +4115,7 @@
         </p:nvSpPr>
         <p:spPr>
           <a:xfrm>
-            <a:off x="6472237" y="5014914"/>
+            <a:off x="6472237" y="4800601"/>
             <a:ext cx="500066" cy="1357322"/>
           </a:xfrm>
           <a:prstGeom prst="rightBrace">
@@ -4161,7 +4161,7 @@
         </p:nvSpPr>
         <p:spPr>
           <a:xfrm>
-            <a:off x="900074" y="7015179"/>
+            <a:off x="900074" y="6800866"/>
             <a:ext cx="5429288" cy="714380"/>
           </a:xfrm>
           <a:prstGeom prst="rect">
@@ -4229,7 +4229,7 @@
         </p:nvSpPr>
         <p:spPr>
           <a:xfrm>
-            <a:off x="7043742" y="6800865"/>
+            <a:off x="7043742" y="6586552"/>
             <a:ext cx="2500330" cy="857256"/>
           </a:xfrm>
           <a:prstGeom prst="rect">
@@ -4287,7 +4287,7 @@
         </p:nvSpPr>
         <p:spPr>
           <a:xfrm>
-            <a:off x="6472238" y="6657989"/>
+            <a:off x="6472238" y="6443676"/>
             <a:ext cx="500066" cy="1143008"/>
           </a:xfrm>
           <a:prstGeom prst="rightBrace">
@@ -4333,7 +4333,7 @@
         </p:nvSpPr>
         <p:spPr>
           <a:xfrm>
-            <a:off x="9615510" y="6372237"/>
+            <a:off x="9615510" y="6157924"/>
             <a:ext cx="500066" cy="428628"/>
           </a:xfrm>
           <a:prstGeom prst="rightBrace">
@@ -4379,7 +4379,7 @@
         </p:nvSpPr>
         <p:spPr>
           <a:xfrm>
-            <a:off x="10187014" y="6015047"/>
+            <a:off x="10187014" y="5800734"/>
             <a:ext cx="1928826" cy="1143008"/>
           </a:xfrm>
           <a:prstGeom prst="rect">
@@ -4428,7 +4428,7 @@
         </p:nvSpPr>
         <p:spPr>
           <a:xfrm>
-            <a:off x="6900866" y="1443014"/>
+            <a:off x="6900866" y="1228701"/>
             <a:ext cx="5214974" cy="369332"/>
           </a:xfrm>
           <a:prstGeom prst="rect">
@@ -4472,7 +4472,7 @@
         </p:nvSpPr>
         <p:spPr>
           <a:xfrm>
-            <a:off x="6900866" y="3371841"/>
+            <a:off x="6900866" y="3157528"/>
             <a:ext cx="5214974" cy="369332"/>
           </a:xfrm>
           <a:prstGeom prst="rect">
@@ -4516,7 +4516,7 @@
         </p:nvSpPr>
         <p:spPr>
           <a:xfrm>
-            <a:off x="6900866" y="6372237"/>
+            <a:off x="6900866" y="6157924"/>
             <a:ext cx="2714644" cy="369332"/>
           </a:xfrm>
           <a:prstGeom prst="rect">
@@ -4560,7 +4560,7 @@
         </p:nvSpPr>
         <p:spPr>
           <a:xfrm>
-            <a:off x="6900866" y="7658121"/>
+            <a:off x="6900866" y="8015311"/>
             <a:ext cx="2714644" cy="369332"/>
           </a:xfrm>
           <a:prstGeom prst="rect">
@@ -4604,7 +4604,7 @@
         </p:nvSpPr>
         <p:spPr>
           <a:xfrm>
-            <a:off x="757198" y="8801128"/>
+            <a:off x="757198" y="9158318"/>
             <a:ext cx="5643602" cy="428628"/>
           </a:xfrm>
           <a:prstGeom prst="rect">
@@ -4660,7 +4660,7 @@
         </p:nvSpPr>
         <p:spPr>
           <a:xfrm>
-            <a:off x="6900866" y="8574672"/>
+            <a:off x="6900866" y="8931862"/>
             <a:ext cx="2714644" cy="369332"/>
           </a:xfrm>
           <a:prstGeom prst="rect">
@@ -4696,7 +4696,7 @@
         </p:nvSpPr>
         <p:spPr>
           <a:xfrm>
-            <a:off x="6900866" y="8931862"/>
+            <a:off x="6900866" y="9289052"/>
             <a:ext cx="2714644" cy="369332"/>
           </a:xfrm>
           <a:prstGeom prst="rect">
@@ -4740,7 +4740,7 @@
         </p:nvSpPr>
         <p:spPr>
           <a:xfrm>
-            <a:off x="9472634" y="8301062"/>
+            <a:off x="9472634" y="8658252"/>
             <a:ext cx="2643206" cy="928694"/>
           </a:xfrm>
           <a:prstGeom prst="rect">
@@ -4796,7 +4796,7 @@
         </p:nvSpPr>
         <p:spPr>
           <a:xfrm>
-            <a:off x="757198" y="8301062"/>
+            <a:off x="757198" y="8658252"/>
             <a:ext cx="5643602" cy="428627"/>
           </a:xfrm>
           <a:prstGeom prst="rect">
@@ -4856,7 +4856,7 @@
         </p:nvSpPr>
         <p:spPr>
           <a:xfrm>
-            <a:off x="6900866" y="8015310"/>
+            <a:off x="6900866" y="8372500"/>
             <a:ext cx="2714644" cy="369332"/>
           </a:xfrm>
           <a:prstGeom prst="rect">
@@ -4880,6 +4880,117 @@
                 </a:solidFill>
               </a:rPr>
               <a:t>ARM_MEM_SIZE</a:t>
+            </a:r>
+            <a:endParaRPr lang="en-US" sz="1800" dirty="0">
+              <a:solidFill>
+                <a:schemeClr val="accent3">
+                  <a:lumMod val="60000"/>
+                  <a:lumOff val="40000"/>
+                </a:schemeClr>
+              </a:solidFill>
+            </a:endParaRPr>
+          </a:p>
+        </p:txBody>
+      </p:sp>
+      <p:sp>
+        <p:nvSpPr>
+          <p:cNvPr id="38" name="Rectangle 37"/>
+          <p:cNvSpPr/>
+          <p:nvPr/>
+        </p:nvSpPr>
+        <p:spPr>
+          <a:xfrm>
+            <a:off x="757198" y="7658120"/>
+            <a:ext cx="5643602" cy="428627"/>
+          </a:xfrm>
+          <a:prstGeom prst="rect">
+            <a:avLst/>
+          </a:prstGeom>
+          <a:solidFill>
+            <a:schemeClr val="accent1">
+              <a:lumMod val="75000"/>
+            </a:schemeClr>
+          </a:solidFill>
+          <a:ln>
+            <a:solidFill>
+              <a:schemeClr val="tx2">
+                <a:lumMod val="60000"/>
+                <a:lumOff val="40000"/>
+              </a:schemeClr>
+            </a:solidFill>
+          </a:ln>
+        </p:spPr>
+        <p:style>
+          <a:lnRef idx="2">
+            <a:schemeClr val="accent1">
+              <a:shade val="50000"/>
+            </a:schemeClr>
+          </a:lnRef>
+          <a:fillRef idx="1">
+            <a:schemeClr val="accent1"/>
+          </a:fillRef>
+          <a:effectRef idx="0">
+            <a:schemeClr val="accent1"/>
+          </a:effectRef>
+          <a:fontRef idx="minor">
+            <a:schemeClr val="lt1"/>
+          </a:fontRef>
+        </p:style>
+        <p:txBody>
+          <a:bodyPr rtlCol="0" anchor="t"/>
+          <a:lstStyle/>
+          <a:p>
+            <a:r>
+              <a:rPr lang="en-US" sz="1800" dirty="0" smtClean="0"/>
+              <a:t>Paging area</a:t>
+            </a:r>
+            <a:endParaRPr lang="en-US" sz="1800" dirty="0"/>
+          </a:p>
+        </p:txBody>
+      </p:sp>
+      <p:sp>
+        <p:nvSpPr>
+          <p:cNvPr id="39" name="TextBox 38"/>
+          <p:cNvSpPr txBox="1"/>
+          <p:nvPr/>
+        </p:nvSpPr>
+        <p:spPr>
+          <a:xfrm>
+            <a:off x="6900866" y="7658120"/>
+            <a:ext cx="4143404" cy="369332"/>
+          </a:xfrm>
+          <a:prstGeom prst="rect">
+            <a:avLst/>
+          </a:prstGeom>
+          <a:noFill/>
+        </p:spPr>
+        <p:txBody>
+          <a:bodyPr wrap="square" rtlCol="0">
+            <a:spAutoFit/>
+          </a:bodyPr>
+          <a:lstStyle/>
+          <a:p>
+            <a:r>
+              <a:rPr lang="en-US" sz="1800" dirty="0" smtClean="0">
+                <a:solidFill>
+                  <a:schemeClr val="accent3">
+                    <a:lumMod val="60000"/>
+                    <a:lumOff val="40000"/>
+                  </a:schemeClr>
+                </a:solidFill>
+              </a:rPr>
+              <a:t>MEM_HEAP_START </a:t>
+            </a:r>
+            <a:r>
+              <a:rPr lang="en-US" sz="1800" dirty="0" smtClean="0">
+                <a:solidFill>
+                  <a:schemeClr val="accent3">
+                    <a:lumMod val="60000"/>
+                    <a:lumOff val="40000"/>
+                  </a:schemeClr>
+                </a:solidFill>
+              </a:rPr>
+              <a:t>- PAGE_RESERVE</a:t>
             </a:r>
             <a:endParaRPr lang="en-US" sz="1800" dirty="0">
               <a:solidFill>

</xml_diff>